<commit_message>
revised TA file and add telegram group
Former-commit-id: bd77bd242ba5d6b6b1082ab628f9c7c68e4c9719 [formerly c3efe963e2b03005109c8df2e09ff3773a01a093] [formerly 0dc6868595ba35ea44d50f1f1409dcd05853bf05 [formerly c014606f1bf58be5a53d0de272c268a3761d6477]]
Former-commit-id: 585afc00c11cf44f018c81ca5a503c3c3777c6da [formerly b311db821fd33c52e5fb328a5c534a0b1f6aa32e]
Former-commit-id: 01703d8b7a30901b0cb778b182637a103cfeacb5
</commit_message>
<xml_diff>
--- a/TA/TA.pptx
+++ b/TA/TA.pptx
@@ -5,14 +5,15 @@
     <p:sldMasterId id="2147483709" r:id="rId1"/>
   </p:sldMasterIdLst>
   <p:notesMasterIdLst>
-    <p:notesMasterId r:id="rId7"/>
+    <p:notesMasterId r:id="rId8"/>
   </p:notesMasterIdLst>
   <p:sldIdLst>
     <p:sldId id="256" r:id="rId2"/>
     <p:sldId id="303" r:id="rId3"/>
-    <p:sldId id="445" r:id="rId4"/>
+    <p:sldId id="447" r:id="rId4"/>
     <p:sldId id="446" r:id="rId5"/>
-    <p:sldId id="444" r:id="rId6"/>
+    <p:sldId id="445" r:id="rId6"/>
+    <p:sldId id="444" r:id="rId7"/>
   </p:sldIdLst>
   <p:sldSz cx="12192000" cy="6858000"/>
   <p:notesSz cx="6858000" cy="9144000"/>
@@ -213,7 +214,7 @@
           <a:p>
             <a:fld id="{E8500A6B-EE94-47F5-BD65-3C6B3EA6CD31}" type="datetimeFigureOut">
               <a:rPr lang="en-US" smtClean="0"/>
-              <a:t>2/17/2020</a:t>
+              <a:t>2/18/2020</a:t>
             </a:fld>
             <a:endParaRPr lang="en-US"/>
           </a:p>
@@ -770,7 +771,7 @@
           <a:p>
             <a:fld id="{276D79ED-3FA7-4EF8-964B-EB8BCFAB02F8}" type="datetimeFigureOut">
               <a:rPr lang="en-US" smtClean="0"/>
-              <a:t>2/17/2020</a:t>
+              <a:t>2/18/2020</a:t>
             </a:fld>
             <a:endParaRPr lang="en-US"/>
           </a:p>
@@ -1034,7 +1035,7 @@
           <a:p>
             <a:fld id="{276D79ED-3FA7-4EF8-964B-EB8BCFAB02F8}" type="datetimeFigureOut">
               <a:rPr lang="en-US" smtClean="0"/>
-              <a:t>2/17/2020</a:t>
+              <a:t>2/18/2020</a:t>
             </a:fld>
             <a:endParaRPr lang="en-US"/>
           </a:p>
@@ -1212,7 +1213,7 @@
             <a:fld id="{276D79ED-3FA7-4EF8-964B-EB8BCFAB02F8}" type="datetimeFigureOut">
               <a:rPr lang="en-US" smtClean="0"/>
               <a:pPr/>
-              <a:t>2/17/2020</a:t>
+              <a:t>2/18/2020</a:t>
             </a:fld>
             <a:endParaRPr lang="en-US"/>
           </a:p>
@@ -1401,7 +1402,7 @@
             <a:fld id="{276D79ED-3FA7-4EF8-964B-EB8BCFAB02F8}" type="datetimeFigureOut">
               <a:rPr lang="en-US" smtClean="0"/>
               <a:pPr/>
-              <a:t>2/17/2020</a:t>
+              <a:t>2/18/2020</a:t>
             </a:fld>
             <a:endParaRPr lang="en-US"/>
           </a:p>
@@ -1536,7 +1537,7 @@
             <a:fld id="{276D79ED-3FA7-4EF8-964B-EB8BCFAB02F8}" type="datetimeFigureOut">
               <a:rPr lang="en-US" smtClean="0"/>
               <a:pPr/>
-              <a:t>2/17/2020</a:t>
+              <a:t>2/18/2020</a:t>
             </a:fld>
             <a:endParaRPr lang="en-US"/>
           </a:p>
@@ -1788,7 +1789,7 @@
           <a:p>
             <a:fld id="{276D79ED-3FA7-4EF8-964B-EB8BCFAB02F8}" type="datetimeFigureOut">
               <a:rPr lang="en-US" smtClean="0"/>
-              <a:t>2/17/2020</a:t>
+              <a:t>2/18/2020</a:t>
             </a:fld>
             <a:endParaRPr lang="en-US"/>
           </a:p>
@@ -2030,7 +2031,7 @@
             <a:fld id="{276D79ED-3FA7-4EF8-964B-EB8BCFAB02F8}" type="datetimeFigureOut">
               <a:rPr lang="en-US" smtClean="0"/>
               <a:pPr/>
-              <a:t>2/17/2020</a:t>
+              <a:t>2/18/2020</a:t>
             </a:fld>
             <a:endParaRPr lang="en-US"/>
           </a:p>
@@ -2284,7 +2285,7 @@
           <a:p>
             <a:fld id="{276D79ED-3FA7-4EF8-964B-EB8BCFAB02F8}" type="datetimeFigureOut">
               <a:rPr lang="en-US" smtClean="0"/>
-              <a:t>2/17/2020</a:t>
+              <a:t>2/18/2020</a:t>
             </a:fld>
             <a:endParaRPr lang="en-US"/>
           </a:p>
@@ -2579,7 +2580,7 @@
           <a:p>
             <a:fld id="{276D79ED-3FA7-4EF8-964B-EB8BCFAB02F8}" type="datetimeFigureOut">
               <a:rPr lang="en-US" smtClean="0"/>
-              <a:t>2/17/2020</a:t>
+              <a:t>2/18/2020</a:t>
             </a:fld>
             <a:endParaRPr lang="en-US"/>
           </a:p>
@@ -3074,7 +3075,7 @@
           <a:p>
             <a:fld id="{276D79ED-3FA7-4EF8-964B-EB8BCFAB02F8}" type="datetimeFigureOut">
               <a:rPr lang="en-US" smtClean="0"/>
-              <a:t>2/17/2020</a:t>
+              <a:t>2/18/2020</a:t>
             </a:fld>
             <a:endParaRPr lang="en-US"/>
           </a:p>
@@ -3199,7 +3200,7 @@
           <a:p>
             <a:fld id="{276D79ED-3FA7-4EF8-964B-EB8BCFAB02F8}" type="datetimeFigureOut">
               <a:rPr lang="en-US" smtClean="0"/>
-              <a:t>2/17/2020</a:t>
+              <a:t>2/18/2020</a:t>
             </a:fld>
             <a:endParaRPr lang="en-US"/>
           </a:p>
@@ -3301,7 +3302,7 @@
           <a:p>
             <a:fld id="{276D79ED-3FA7-4EF8-964B-EB8BCFAB02F8}" type="datetimeFigureOut">
               <a:rPr lang="en-US" smtClean="0"/>
-              <a:t>2/17/2020</a:t>
+              <a:t>2/18/2020</a:t>
             </a:fld>
             <a:endParaRPr lang="en-US"/>
           </a:p>
@@ -3585,7 +3586,7 @@
           <a:p>
             <a:fld id="{276D79ED-3FA7-4EF8-964B-EB8BCFAB02F8}" type="datetimeFigureOut">
               <a:rPr lang="en-US" smtClean="0"/>
-              <a:t>2/17/2020</a:t>
+              <a:t>2/18/2020</a:t>
             </a:fld>
             <a:endParaRPr lang="en-US"/>
           </a:p>
@@ -3815,7 +3816,7 @@
             <a:fld id="{276D79ED-3FA7-4EF8-964B-EB8BCFAB02F8}" type="datetimeFigureOut">
               <a:rPr lang="en-US" smtClean="0"/>
               <a:pPr/>
-              <a:t>2/17/2020</a:t>
+              <a:t>2/18/2020</a:t>
             </a:fld>
             <a:endParaRPr lang="en-US"/>
           </a:p>
@@ -4428,19 +4429,7 @@
               <a:rPr lang="en-US" sz="2400" dirty="0" smtClean="0">
                 <a:latin typeface="Comic Sans MS" panose="030F0702030302020204" pitchFamily="66" charset="0"/>
               </a:rPr>
-              <a:t>Shiva </a:t>
-            </a:r>
-            <a:r>
-              <a:rPr lang="en-US" sz="2400" dirty="0" err="1">
-                <a:latin typeface="Comic Sans MS" panose="030F0702030302020204" pitchFamily="66" charset="0"/>
-              </a:rPr>
-              <a:t>Kazemi</a:t>
-            </a:r>
-            <a:r>
-              <a:rPr lang="en-US" sz="2400" dirty="0">
-                <a:latin typeface="Comic Sans MS" panose="030F0702030302020204" pitchFamily="66" charset="0"/>
-              </a:rPr>
-              <a:t>, </a:t>
+              <a:t>Shiva Kazemi and </a:t>
             </a:r>
             <a:r>
               <a:rPr lang="en-US" sz="2400" dirty="0" err="1">
@@ -4677,7 +4666,7 @@
               <a:rPr lang="en-US" sz="2400" dirty="0" smtClean="0">
                 <a:latin typeface="Comic Sans MS" panose="030F0702030302020204" pitchFamily="66" charset="0"/>
               </a:rPr>
-              <a:t> Software implementation</a:t>
+              <a:t> Software Implementation</a:t>
             </a:r>
             <a:endParaRPr lang="fa-IR" sz="2400" dirty="0" smtClean="0">
               <a:latin typeface="Comic Sans MS" panose="030F0702030302020204" pitchFamily="66" charset="0"/>
@@ -4822,29 +4811,36 @@
               </a:lnSpc>
             </a:pPr>
             <a:r>
+              <a:rPr lang="en-US" sz="2400" b="1" dirty="0" smtClean="0">
+                <a:latin typeface="Comic Sans MS" panose="030F0702030302020204" pitchFamily="66" charset="0"/>
+              </a:rPr>
+              <a:t>Doing </a:t>
+            </a:r>
+            <a:r>
               <a:rPr lang="en-US" sz="2400" b="1" dirty="0">
                 <a:latin typeface="Comic Sans MS" panose="030F0702030302020204" pitchFamily="66" charset="0"/>
-                <a:hlinkClick r:id="rId2"/>
-              </a:rPr>
-              <a:t>https://</a:t>
-            </a:r>
-            <a:r>
-              <a:rPr lang="en-US" sz="2400" b="1">
-                <a:latin typeface="Comic Sans MS" panose="030F0702030302020204" pitchFamily="66" charset="0"/>
-                <a:hlinkClick r:id="rId2"/>
-              </a:rPr>
-              <a:t>courses.aut.ac.ir</a:t>
-            </a:r>
-            <a:r>
-              <a:rPr lang="en-US" sz="2400" b="1" smtClean="0">
-                <a:latin typeface="Comic Sans MS" panose="030F0702030302020204" pitchFamily="66" charset="0"/>
-                <a:hlinkClick r:id="rId2"/>
-              </a:rPr>
-              <a:t>/</a:t>
-            </a:r>
-            <a:endParaRPr lang="en-US" sz="2400" b="1" dirty="0">
-              <a:latin typeface="Comic Sans MS" panose="030F0702030302020204" pitchFamily="66" charset="0"/>
-            </a:endParaRPr>
+              </a:rPr>
+              <a:t>homework </a:t>
+            </a:r>
+            <a:r>
+              <a:rPr lang="en-US" sz="2400" b="1" dirty="0" smtClean="0">
+                <a:latin typeface="Comic Sans MS" panose="030F0702030302020204" pitchFamily="66" charset="0"/>
+              </a:rPr>
+              <a:t>individually</a:t>
+            </a:r>
+          </a:p>
+          <a:p>
+            <a:pPr indent="15875" algn="just">
+              <a:lnSpc>
+                <a:spcPct val="170000"/>
+              </a:lnSpc>
+            </a:pPr>
+            <a:r>
+              <a:rPr lang="en-US" sz="1800" dirty="0" smtClean="0">
+                <a:latin typeface="Comic Sans MS" panose="030F0702030302020204" pitchFamily="66" charset="0"/>
+              </a:rPr>
+              <a:t> The homework should be hand-written </a:t>
+            </a:r>
           </a:p>
           <a:p>
             <a:pPr algn="just">
@@ -4856,23 +4852,11 @@
               <a:rPr lang="en-US" sz="2400" b="1" dirty="0" smtClean="0">
                 <a:latin typeface="Comic Sans MS" panose="030F0702030302020204" pitchFamily="66" charset="0"/>
               </a:rPr>
-              <a:t>Doing </a:t>
-            </a:r>
-            <a:r>
-              <a:rPr lang="en-US" sz="2400" b="1" dirty="0">
-                <a:latin typeface="Comic Sans MS" panose="030F0702030302020204" pitchFamily="66" charset="0"/>
-              </a:rPr>
-              <a:t>homework </a:t>
-            </a:r>
-            <a:r>
-              <a:rPr lang="en-US" sz="2400" b="1" dirty="0" smtClean="0">
-                <a:latin typeface="Comic Sans MS" panose="030F0702030302020204" pitchFamily="66" charset="0"/>
-              </a:rPr>
-              <a:t>individually</a:t>
-            </a:r>
-          </a:p>
-          <a:p>
-            <a:pPr indent="15875" algn="just">
+              <a:t>Doing Assignment &amp; Mini-Project in a group up to three members</a:t>
+            </a:r>
+          </a:p>
+          <a:p>
+            <a:pPr marL="536575" indent="-177800" algn="just">
               <a:lnSpc>
                 <a:spcPct val="170000"/>
               </a:lnSpc>
@@ -4881,8 +4865,35 @@
               <a:rPr lang="en-US" sz="1800" dirty="0" smtClean="0">
                 <a:latin typeface="Comic Sans MS" panose="030F0702030302020204" pitchFamily="66" charset="0"/>
               </a:rPr>
-              <a:t> The homework should be hand-written </a:t>
-            </a:r>
+              <a:t> The Assignment &amp; Mini-Project </a:t>
+            </a:r>
+            <a:r>
+              <a:rPr lang="en-US" sz="1800" dirty="0">
+                <a:latin typeface="Comic Sans MS" panose="030F0702030302020204" pitchFamily="66" charset="0"/>
+              </a:rPr>
+              <a:t>should be </a:t>
+            </a:r>
+            <a:r>
+              <a:rPr lang="en-US" sz="1800" dirty="0" smtClean="0">
+                <a:latin typeface="Comic Sans MS" panose="030F0702030302020204" pitchFamily="66" charset="0"/>
+              </a:rPr>
+              <a:t>sent in a zip/</a:t>
+            </a:r>
+            <a:r>
+              <a:rPr lang="en-US" sz="1800" dirty="0" err="1" smtClean="0">
+                <a:latin typeface="Comic Sans MS" panose="030F0702030302020204" pitchFamily="66" charset="0"/>
+              </a:rPr>
+              <a:t>rar</a:t>
+            </a:r>
+            <a:r>
+              <a:rPr lang="en-US" sz="1800" dirty="0" smtClean="0">
+                <a:latin typeface="Comic Sans MS" panose="030F0702030302020204" pitchFamily="66" charset="0"/>
+              </a:rPr>
+              <a:t> file including a report and source codes</a:t>
+            </a:r>
+            <a:endParaRPr lang="en-US" sz="1800" dirty="0">
+              <a:latin typeface="Comic Sans MS" panose="030F0702030302020204" pitchFamily="66" charset="0"/>
+            </a:endParaRPr>
           </a:p>
           <a:p>
             <a:pPr algn="just">
@@ -4894,61 +4905,27 @@
               <a:rPr lang="en-US" sz="2400" b="1" dirty="0" smtClean="0">
                 <a:latin typeface="Comic Sans MS" panose="030F0702030302020204" pitchFamily="66" charset="0"/>
               </a:rPr>
-              <a:t>Doing </a:t>
+              <a:t>Group should present </a:t>
+            </a:r>
+            <a:r>
+              <a:rPr lang="en-US" sz="2400" b="1" dirty="0">
+                <a:latin typeface="Comic Sans MS" panose="030F0702030302020204" pitchFamily="66" charset="0"/>
+              </a:rPr>
+              <a:t>some </a:t>
             </a:r>
             <a:r>
               <a:rPr lang="en-US" sz="2400" b="1" dirty="0" smtClean="0">
                 <a:latin typeface="Comic Sans MS" panose="030F0702030302020204" pitchFamily="66" charset="0"/>
               </a:rPr>
-              <a:t>Assignment &amp; Mini-Project in a group up to three </a:t>
-            </a:r>
-            <a:r>
-              <a:rPr lang="en-US" sz="2400" b="1" dirty="0" smtClean="0">
-                <a:latin typeface="Comic Sans MS" panose="030F0702030302020204" pitchFamily="66" charset="0"/>
-              </a:rPr>
-              <a:t>members</a:t>
+              <a:t>assignments for the </a:t>
+            </a:r>
+            <a:r>
+              <a:rPr lang="en-US" sz="2400" b="1" dirty="0" err="1" smtClean="0">
+                <a:latin typeface="Comic Sans MS" panose="030F0702030302020204" pitchFamily="66" charset="0"/>
+              </a:rPr>
+              <a:t>Tas</a:t>
             </a:r>
             <a:endParaRPr lang="en-US" sz="2400" b="1" dirty="0" smtClean="0">
-              <a:latin typeface="Comic Sans MS" panose="030F0702030302020204" pitchFamily="66" charset="0"/>
-            </a:endParaRPr>
-          </a:p>
-          <a:p>
-            <a:pPr marL="536575" indent="-177800" algn="just">
-              <a:lnSpc>
-                <a:spcPct val="170000"/>
-              </a:lnSpc>
-            </a:pPr>
-            <a:r>
-              <a:rPr lang="en-US" sz="1800" dirty="0" smtClean="0">
-                <a:latin typeface="Comic Sans MS" panose="030F0702030302020204" pitchFamily="66" charset="0"/>
-              </a:rPr>
-              <a:t> The Assignment &amp; Mini-Project </a:t>
-            </a:r>
-            <a:r>
-              <a:rPr lang="en-US" sz="1800" dirty="0">
-                <a:latin typeface="Comic Sans MS" panose="030F0702030302020204" pitchFamily="66" charset="0"/>
-              </a:rPr>
-              <a:t>should be </a:t>
-            </a:r>
-            <a:r>
-              <a:rPr lang="en-US" sz="1800" dirty="0" smtClean="0">
-                <a:latin typeface="Comic Sans MS" panose="030F0702030302020204" pitchFamily="66" charset="0"/>
-              </a:rPr>
-              <a:t>sent in a zip/</a:t>
-            </a:r>
-            <a:r>
-              <a:rPr lang="en-US" sz="1800" dirty="0" err="1" smtClean="0">
-                <a:latin typeface="Comic Sans MS" panose="030F0702030302020204" pitchFamily="66" charset="0"/>
-              </a:rPr>
-              <a:t>rar</a:t>
-            </a:r>
-            <a:r>
-              <a:rPr lang="en-US" sz="1800" dirty="0" smtClean="0">
-                <a:latin typeface="Comic Sans MS" panose="030F0702030302020204" pitchFamily="66" charset="0"/>
-              </a:rPr>
-              <a:t> file including a report and source codes</a:t>
-            </a:r>
-            <a:endParaRPr lang="en-US" sz="1800" dirty="0">
               <a:latin typeface="Comic Sans MS" panose="030F0702030302020204" pitchFamily="66" charset="0"/>
             </a:endParaRPr>
           </a:p>
@@ -4959,34 +4936,10 @@
               </a:lnSpc>
             </a:pPr>
             <a:r>
-              <a:rPr lang="en-US" sz="2400" b="1" dirty="0" smtClean="0">
-                <a:latin typeface="Comic Sans MS" panose="030F0702030302020204" pitchFamily="66" charset="0"/>
-              </a:rPr>
-              <a:t>Group </a:t>
-            </a:r>
-            <a:r>
-              <a:rPr lang="en-US" sz="2400" b="1" dirty="0" smtClean="0">
-                <a:latin typeface="Comic Sans MS" panose="030F0702030302020204" pitchFamily="66" charset="0"/>
-              </a:rPr>
-              <a:t>should present </a:t>
-            </a:r>
-            <a:r>
               <a:rPr lang="en-US" sz="2400" b="1" dirty="0">
                 <a:latin typeface="Comic Sans MS" panose="030F0702030302020204" pitchFamily="66" charset="0"/>
               </a:rPr>
-              <a:t>some </a:t>
-            </a:r>
-            <a:r>
-              <a:rPr lang="en-US" sz="2400" b="1" dirty="0" smtClean="0">
-                <a:latin typeface="Comic Sans MS" panose="030F0702030302020204" pitchFamily="66" charset="0"/>
-              </a:rPr>
-              <a:t>assignments for the </a:t>
-            </a:r>
-            <a:r>
-              <a:rPr lang="en-US" sz="2400" b="1" dirty="0" smtClean="0">
-                <a:latin typeface="Comic Sans MS" panose="030F0702030302020204" pitchFamily="66" charset="0"/>
-              </a:rPr>
-              <a:t>TA</a:t>
+              <a:t>We will have TA’s class on Sundays or Tuesdays every two weeks</a:t>
             </a:r>
           </a:p>
           <a:p>
@@ -4995,7 +4948,7 @@
                 <a:spcPct val="170000"/>
               </a:lnSpc>
             </a:pPr>
-            <a:endParaRPr lang="en-US" sz="2400" b="1" dirty="0">
+            <a:endParaRPr lang="en-US" sz="2400" b="1" dirty="0" smtClean="0">
               <a:latin typeface="Comic Sans MS" panose="030F0702030302020204" pitchFamily="66" charset="0"/>
             </a:endParaRPr>
           </a:p>
@@ -5004,7 +4957,7 @@
     </p:spTree>
     <p:extLst>
       <p:ext uri="{BB962C8B-B14F-4D97-AF65-F5344CB8AC3E}">
-        <p14:creationId xmlns:p14="http://schemas.microsoft.com/office/powerpoint/2010/main" val="2607839392"/>
+        <p14:creationId xmlns:p14="http://schemas.microsoft.com/office/powerpoint/2010/main" val="963267292"/>
       </p:ext>
     </p:extLst>
   </p:cSld>
@@ -5085,7 +5038,7 @@
         </p:nvSpPr>
         <p:spPr>
           <a:xfrm>
-            <a:off x="700424" y="1302344"/>
+            <a:off x="700424" y="1780646"/>
             <a:ext cx="2551823" cy="4372592"/>
           </a:xfrm>
         </p:spPr>
@@ -5184,9 +5137,6 @@
               </a:rPr>
               <a:t>Lecture-3</a:t>
             </a:r>
-            <a:endParaRPr lang="en-US" sz="2000" dirty="0">
-              <a:latin typeface="Comic Sans MS" panose="030F0702030302020204" pitchFamily="66" charset="0"/>
-            </a:endParaRPr>
           </a:p>
           <a:p>
             <a:pPr indent="15875" algn="just">
@@ -5211,7 +5161,7 @@
               <a:rPr lang="en-US" sz="1600" dirty="0" smtClean="0">
                 <a:latin typeface="Comic Sans MS" panose="030F0702030302020204" pitchFamily="66" charset="0"/>
               </a:rPr>
-              <a:t>  three assignments</a:t>
+              <a:t>  Three assignments</a:t>
             </a:r>
           </a:p>
         </p:txBody>
@@ -5226,7 +5176,7 @@
         </p:nvSpPr>
         <p:spPr>
           <a:xfrm>
-            <a:off x="6007715" y="1302343"/>
+            <a:off x="5951444" y="1780646"/>
             <a:ext cx="2363287" cy="3561887"/>
           </a:xfrm>
           <a:prstGeom prst="rect">
@@ -5572,8 +5522,250 @@
         </p:nvSpPr>
         <p:spPr>
           <a:xfrm>
-            <a:off x="5651293" y="2593446"/>
-            <a:ext cx="839448" cy="1408928"/>
+            <a:off x="700424" y="374901"/>
+            <a:ext cx="10791153" cy="763525"/>
+          </a:xfrm>
+        </p:spPr>
+        <p:txBody>
+          <a:bodyPr>
+            <a:normAutofit/>
+          </a:bodyPr>
+          <a:lstStyle/>
+          <a:p>
+            <a:pPr algn="l"/>
+            <a:r>
+              <a:rPr lang="en-US" dirty="0" smtClean="0">
+                <a:latin typeface="Comic Sans MS" panose="030F0702030302020204" pitchFamily="66" charset="0"/>
+              </a:rPr>
+              <a:t>Contact us</a:t>
+            </a:r>
+            <a:endParaRPr lang="en-US" dirty="0">
+              <a:latin typeface="Comic Sans MS" panose="030F0702030302020204" pitchFamily="66" charset="0"/>
+            </a:endParaRPr>
+          </a:p>
+        </p:txBody>
+      </p:sp>
+      <p:sp>
+        <p:nvSpPr>
+          <p:cNvPr id="4" name="Content Placeholder 2"/>
+          <p:cNvSpPr>
+            <a:spLocks noGrp="1"/>
+          </p:cNvSpPr>
+          <p:nvPr>
+            <p:ph idx="1"/>
+          </p:nvPr>
+        </p:nvSpPr>
+        <p:spPr>
+          <a:xfrm>
+            <a:off x="700424" y="1302344"/>
+            <a:ext cx="10791153" cy="5428240"/>
+          </a:xfrm>
+        </p:spPr>
+        <p:txBody>
+          <a:bodyPr>
+            <a:normAutofit/>
+          </a:bodyPr>
+          <a:lstStyle/>
+          <a:p>
+            <a:pPr algn="just">
+              <a:lnSpc>
+                <a:spcPct val="170000"/>
+              </a:lnSpc>
+            </a:pPr>
+            <a:r>
+              <a:rPr lang="en-US" sz="2400" b="1" dirty="0" smtClean="0">
+                <a:latin typeface="Comic Sans MS" panose="030F0702030302020204" pitchFamily="66" charset="0"/>
+              </a:rPr>
+              <a:t>Course page: </a:t>
+            </a:r>
+            <a:r>
+              <a:rPr lang="en-US" sz="2400" b="1" dirty="0" smtClean="0">
+                <a:latin typeface="Comic Sans MS" panose="030F0702030302020204" pitchFamily="66" charset="0"/>
+                <a:hlinkClick r:id="rId2"/>
+              </a:rPr>
+              <a:t>https</a:t>
+            </a:r>
+            <a:r>
+              <a:rPr lang="en-US" sz="2400" b="1" dirty="0">
+                <a:latin typeface="Comic Sans MS" panose="030F0702030302020204" pitchFamily="66" charset="0"/>
+                <a:hlinkClick r:id="rId2"/>
+              </a:rPr>
+              <a:t>://courses.aut.ac.ir</a:t>
+            </a:r>
+            <a:r>
+              <a:rPr lang="en-US" sz="2400" b="1" dirty="0" smtClean="0">
+                <a:latin typeface="Comic Sans MS" panose="030F0702030302020204" pitchFamily="66" charset="0"/>
+                <a:hlinkClick r:id="rId2"/>
+              </a:rPr>
+              <a:t>/</a:t>
+            </a:r>
+            <a:endParaRPr lang="en-US" sz="2400" b="1" dirty="0" smtClean="0">
+              <a:latin typeface="Comic Sans MS" panose="030F0702030302020204" pitchFamily="66" charset="0"/>
+            </a:endParaRPr>
+          </a:p>
+          <a:p>
+            <a:pPr algn="just">
+              <a:lnSpc>
+                <a:spcPct val="170000"/>
+              </a:lnSpc>
+            </a:pPr>
+            <a:r>
+              <a:rPr lang="en-US" sz="2400" b="1" dirty="0">
+                <a:latin typeface="Comic Sans MS" panose="030F0702030302020204" pitchFamily="66" charset="0"/>
+              </a:rPr>
+              <a:t>Telegram group: </a:t>
+            </a:r>
+            <a:r>
+              <a:rPr lang="en-US" sz="2400" b="1" dirty="0">
+                <a:latin typeface="Comic Sans MS" panose="030F0702030302020204" pitchFamily="66" charset="0"/>
+                <a:hlinkClick r:id="rId3"/>
+              </a:rPr>
+              <a:t>https://</a:t>
+            </a:r>
+            <a:r>
+              <a:rPr lang="en-US" sz="2400" b="1" dirty="0" smtClean="0">
+                <a:latin typeface="Comic Sans MS" panose="030F0702030302020204" pitchFamily="66" charset="0"/>
+                <a:hlinkClick r:id="rId3"/>
+              </a:rPr>
+              <a:t>t.me/joinchat/FDso3hSczCEo4dVZ9S9P4A</a:t>
+            </a:r>
+            <a:endParaRPr lang="en-US" sz="2400" b="1" dirty="0" smtClean="0">
+              <a:latin typeface="Comic Sans MS" panose="030F0702030302020204" pitchFamily="66" charset="0"/>
+            </a:endParaRPr>
+          </a:p>
+          <a:p>
+            <a:pPr algn="just">
+              <a:lnSpc>
+                <a:spcPct val="170000"/>
+              </a:lnSpc>
+            </a:pPr>
+            <a:r>
+              <a:rPr lang="en-US" sz="2400" b="1" dirty="0" smtClean="0">
+                <a:latin typeface="Comic Sans MS" panose="030F0702030302020204" pitchFamily="66" charset="0"/>
+              </a:rPr>
+              <a:t>TAs‘ email:</a:t>
+            </a:r>
+          </a:p>
+          <a:p>
+            <a:pPr lvl="1" algn="just">
+              <a:lnSpc>
+                <a:spcPct val="170000"/>
+              </a:lnSpc>
+              <a:buFont typeface="Arial" panose="020B0604020202020204" pitchFamily="34" charset="0"/>
+              <a:buChar char="•"/>
+            </a:pPr>
+            <a:r>
+              <a:rPr lang="en-US" sz="2400" b="1" dirty="0" smtClean="0">
+                <a:latin typeface="Comic Sans MS" panose="030F0702030302020204" pitchFamily="66" charset="0"/>
+              </a:rPr>
+              <a:t>Kazemi: </a:t>
+            </a:r>
+            <a:r>
+              <a:rPr lang="en-US" sz="2400" b="1" dirty="0" smtClean="0">
+                <a:latin typeface="Comic Sans MS" panose="030F0702030302020204" pitchFamily="66" charset="0"/>
+                <a:hlinkClick r:id="rId4"/>
+              </a:rPr>
+              <a:t>shiva.Kazemi.t@gmail.com</a:t>
+            </a:r>
+            <a:endParaRPr lang="en-US" sz="2400" b="1" dirty="0" smtClean="0">
+              <a:latin typeface="Comic Sans MS" panose="030F0702030302020204" pitchFamily="66" charset="0"/>
+            </a:endParaRPr>
+          </a:p>
+          <a:p>
+            <a:pPr lvl="1" algn="just">
+              <a:lnSpc>
+                <a:spcPct val="170000"/>
+              </a:lnSpc>
+              <a:buFont typeface="Arial" panose="020B0604020202020204" pitchFamily="34" charset="0"/>
+              <a:buChar char="•"/>
+            </a:pPr>
+            <a:r>
+              <a:rPr lang="en-US" sz="2400" b="1" dirty="0" err="1" smtClean="0">
+                <a:latin typeface="Comic Sans MS" panose="030F0702030302020204" pitchFamily="66" charset="0"/>
+              </a:rPr>
+              <a:t>Babaki</a:t>
+            </a:r>
+            <a:r>
+              <a:rPr lang="en-US" sz="2400" b="1" dirty="0">
+                <a:latin typeface="Comic Sans MS" panose="030F0702030302020204" pitchFamily="66" charset="0"/>
+              </a:rPr>
+              <a:t>: </a:t>
+            </a:r>
+            <a:r>
+              <a:rPr lang="en-US" sz="2400" b="1" dirty="0" smtClean="0">
+                <a:latin typeface="Comic Sans MS" panose="030F0702030302020204" pitchFamily="66" charset="0"/>
+                <a:hlinkClick r:id="rId5"/>
+              </a:rPr>
+              <a:t>jaber.babaki94@gmail.com</a:t>
+            </a:r>
+            <a:endParaRPr lang="en-US" sz="2400" b="1" dirty="0" smtClean="0">
+              <a:latin typeface="Comic Sans MS" panose="030F0702030302020204" pitchFamily="66" charset="0"/>
+            </a:endParaRPr>
+          </a:p>
+          <a:p>
+            <a:pPr marL="457200" lvl="1" indent="0" algn="just">
+              <a:lnSpc>
+                <a:spcPct val="170000"/>
+              </a:lnSpc>
+              <a:buNone/>
+            </a:pPr>
+            <a:endParaRPr lang="en-US" sz="2400" b="1" dirty="0" smtClean="0">
+              <a:latin typeface="Comic Sans MS" panose="030F0702030302020204" pitchFamily="66" charset="0"/>
+            </a:endParaRPr>
+          </a:p>
+        </p:txBody>
+      </p:sp>
+    </p:spTree>
+    <p:extLst>
+      <p:ext uri="{BB962C8B-B14F-4D97-AF65-F5344CB8AC3E}">
+        <p14:creationId xmlns:p14="http://schemas.microsoft.com/office/powerpoint/2010/main" val="2607839392"/>
+      </p:ext>
+    </p:extLst>
+  </p:cSld>
+  <p:clrMapOvr>
+    <a:masterClrMapping/>
+  </p:clrMapOvr>
+  <p:timing>
+    <p:tnLst>
+      <p:par>
+        <p:cTn id="1" dur="indefinite" restart="never" nodeType="tmRoot"/>
+      </p:par>
+    </p:tnLst>
+  </p:timing>
+</p:sld>
+</file>
+
+<file path=ppt/slides/slide6.xml><?xml version="1.0" encoding="utf-8"?>
+<p:sld xmlns:a="http://schemas.openxmlformats.org/drawingml/2006/main" xmlns:r="http://schemas.openxmlformats.org/officeDocument/2006/relationships" xmlns:p="http://schemas.openxmlformats.org/presentationml/2006/main">
+  <p:cSld>
+    <p:spTree>
+      <p:nvGrpSpPr>
+        <p:cNvPr id="1" name=""/>
+        <p:cNvGrpSpPr/>
+        <p:nvPr/>
+      </p:nvGrpSpPr>
+      <p:grpSpPr>
+        <a:xfrm>
+          <a:off x="0" y="0"/>
+          <a:ext cx="0" cy="0"/>
+          <a:chOff x="0" y="0"/>
+          <a:chExt cx="0" cy="0"/>
+        </a:xfrm>
+      </p:grpSpPr>
+      <p:sp>
+        <p:nvSpPr>
+          <p:cNvPr id="2" name="Title 1"/>
+          <p:cNvSpPr>
+            <a:spLocks noGrp="1"/>
+          </p:cNvSpPr>
+          <p:nvPr>
+            <p:ph type="title"/>
+          </p:nvPr>
+        </p:nvSpPr>
+        <p:spPr>
+          <a:xfrm>
+            <a:off x="1800665" y="2593446"/>
+            <a:ext cx="8567224" cy="1408928"/>
           </a:xfrm>
         </p:spPr>
         <p:txBody>
@@ -5587,7 +5779,7 @@
               <a:rPr lang="en-US" sz="8800" dirty="0" smtClean="0">
                 <a:latin typeface="Comic Sans MS" panose="030F0702030302020204" pitchFamily="66" charset="0"/>
               </a:rPr>
-              <a:t>?</a:t>
+              <a:t>Any Question ?</a:t>
             </a:r>
             <a:endParaRPr lang="en-US" sz="8800" dirty="0">
               <a:latin typeface="Comic Sans MS" panose="030F0702030302020204" pitchFamily="66" charset="0"/>

</xml_diff>